<commit_message>
LOGO VALUYO Y PEQUEÑAS REFACTORIZACIONES
</commit_message>
<xml_diff>
--- a/web/Documentos/Presentacion VALYOO(Fase de codificación).pptx
+++ b/web/Documentos/Presentacion VALYOO(Fase de codificación).pptx
@@ -5,7 +5,7 @@
     <p:sldMasterId id="2147483648" r:id="rId1"/>
   </p:sldMasterIdLst>
   <p:notesMasterIdLst>
-    <p:notesMasterId r:id="rId13"/>
+    <p:notesMasterId r:id="rId15"/>
   </p:notesMasterIdLst>
   <p:sldIdLst>
     <p:sldId id="256" r:id="rId2"/>
@@ -18,24 +18,26 @@
     <p:sldId id="263" r:id="rId9"/>
     <p:sldId id="264" r:id="rId10"/>
     <p:sldId id="265" r:id="rId11"/>
-    <p:sldId id="266" r:id="rId12"/>
+    <p:sldId id="268" r:id="rId12"/>
+    <p:sldId id="267" r:id="rId13"/>
+    <p:sldId id="266" r:id="rId14"/>
   </p:sldIdLst>
   <p:sldSz cx="9144000" cy="5143500" type="screen16x9"/>
   <p:notesSz cx="6858000" cy="9144000"/>
   <p:embeddedFontLst>
     <p:embeddedFont>
-      <p:font typeface="Poppins" panose="00000500000000000000" pitchFamily="2" charset="0"/>
-      <p:regular r:id="rId14"/>
-      <p:bold r:id="rId15"/>
-      <p:italic r:id="rId16"/>
-      <p:boldItalic r:id="rId17"/>
+      <p:font typeface="Poppins" panose="020B0604020202020204" charset="0"/>
+      <p:regular r:id="rId16"/>
+      <p:bold r:id="rId17"/>
+      <p:italic r:id="rId18"/>
+      <p:boldItalic r:id="rId19"/>
     </p:embeddedFont>
     <p:embeddedFont>
-      <p:font typeface="Poppins Light" panose="00000400000000000000" pitchFamily="2" charset="0"/>
-      <p:regular r:id="rId18"/>
-      <p:bold r:id="rId19"/>
-      <p:italic r:id="rId20"/>
-      <p:boldItalic r:id="rId21"/>
+      <p:font typeface="Poppins Light" panose="020B0604020202020204" charset="0"/>
+      <p:regular r:id="rId20"/>
+      <p:bold r:id="rId21"/>
+      <p:italic r:id="rId22"/>
+      <p:boldItalic r:id="rId23"/>
     </p:embeddedFont>
   </p:embeddedFontLst>
   <p:defaultTextStyle>
@@ -268,6 +270,9 @@
     </a:lvl9pPr>
   </p:defaultTextStyle>
   <p:extLst>
+    <p:ext uri="{EFAFB233-063F-42B5-8137-9DF3F51BA10A}">
+      <p15:sldGuideLst xmlns:p15="http://schemas.microsoft.com/office/powerpoint/2012/main"/>
+    </p:ext>
     <p:ext uri="http://customooxmlschemas.google.com/">
       <go:slidesCustomData xmlns:go="http://customooxmlschemas.google.com/" xmlns:ahyp="http://schemas.microsoft.com/office/drawing/2018/hyperlinkcolor" xmlns:p15="http://schemas.microsoft.com/office/powerpoint/2012/main" xmlns:p14="http://schemas.microsoft.com/office/powerpoint/2010/main" xmlns:com="http://schemas.openxmlformats.org/drawingml/2006/compatibility" xmlns:pvml="urn:schemas-microsoft-com:office:powerpoint" xmlns:v="urn:schemas-microsoft-com:vml" xmlns:o="urn:schemas-microsoft-com:office:office" xmlns:dgm="http://schemas.openxmlformats.org/drawingml/2006/diagram" xmlns:c="http://schemas.openxmlformats.org/drawingml/2006/chart" xmlns:mv="urn:schemas-microsoft-com:mac:vml" xmlns:mc="http://schemas.openxmlformats.org/markup-compatibility/2006" xmlns="" r:id="rId24" roundtripDataSignature="AMtx7mhXLx4v+NGPeRlDYFbWpAt6zKInnA=="/>
     </p:ext>
@@ -1099,6 +1104,260 @@
 </file>
 
 <file path=ppt/notesSlides/notesSlide11.xml><?xml version="1.0" encoding="utf-8"?>
+<p:notes xmlns:a="http://schemas.openxmlformats.org/drawingml/2006/main" xmlns:r="http://schemas.openxmlformats.org/officeDocument/2006/relationships" xmlns:p="http://schemas.openxmlformats.org/presentationml/2006/main" showMasterSp="0" showMasterPhAnim="0">
+  <p:cSld>
+    <p:spTree>
+      <p:nvGrpSpPr>
+        <p:cNvPr id="1" name="Shape 169"/>
+        <p:cNvGrpSpPr/>
+        <p:nvPr/>
+      </p:nvGrpSpPr>
+      <p:grpSpPr>
+        <a:xfrm>
+          <a:off x="0" y="0"/>
+          <a:ext cx="0" cy="0"/>
+          <a:chOff x="0" y="0"/>
+          <a:chExt cx="0" cy="0"/>
+        </a:xfrm>
+      </p:grpSpPr>
+      <p:sp>
+        <p:nvSpPr>
+          <p:cNvPr id="170" name="Google Shape;170;p14:notes"/>
+          <p:cNvSpPr>
+            <a:spLocks noGrp="1" noRot="1" noChangeAspect="1"/>
+          </p:cNvSpPr>
+          <p:nvPr>
+            <p:ph type="sldImg" idx="2"/>
+          </p:nvPr>
+        </p:nvSpPr>
+        <p:spPr>
+          <a:xfrm>
+            <a:off x="381000" y="685800"/>
+            <a:ext cx="6096000" cy="3429000"/>
+          </a:xfrm>
+          <a:custGeom>
+            <a:avLst/>
+            <a:gdLst/>
+            <a:ahLst/>
+            <a:cxnLst/>
+            <a:rect l="l" t="t" r="r" b="b"/>
+            <a:pathLst>
+              <a:path w="120000" h="120000" extrusionOk="0">
+                <a:moveTo>
+                  <a:pt x="0" y="0"/>
+                </a:moveTo>
+                <a:lnTo>
+                  <a:pt x="120000" y="0"/>
+                </a:lnTo>
+                <a:lnTo>
+                  <a:pt x="120000" y="120000"/>
+                </a:lnTo>
+                <a:lnTo>
+                  <a:pt x="0" y="120000"/>
+                </a:lnTo>
+                <a:close/>
+              </a:path>
+            </a:pathLst>
+          </a:custGeom>
+          <a:noFill/>
+          <a:ln w="9525" cap="flat" cmpd="sng">
+            <a:solidFill>
+              <a:srgbClr val="000000"/>
+            </a:solidFill>
+            <a:prstDash val="solid"/>
+            <a:round/>
+            <a:headEnd type="none" w="sm" len="sm"/>
+            <a:tailEnd type="none" w="sm" len="sm"/>
+          </a:ln>
+        </p:spPr>
+      </p:sp>
+      <p:sp>
+        <p:nvSpPr>
+          <p:cNvPr id="171" name="Google Shape;171;p14:notes"/>
+          <p:cNvSpPr txBox="1">
+            <a:spLocks noGrp="1"/>
+          </p:cNvSpPr>
+          <p:nvPr>
+            <p:ph type="body" idx="1"/>
+          </p:nvPr>
+        </p:nvSpPr>
+        <p:spPr>
+          <a:xfrm>
+            <a:off x="685800" y="4343400"/>
+            <a:ext cx="5486400" cy="4114800"/>
+          </a:xfrm>
+          <a:prstGeom prst="rect">
+            <a:avLst/>
+          </a:prstGeom>
+          <a:noFill/>
+          <a:ln>
+            <a:noFill/>
+          </a:ln>
+        </p:spPr>
+        <p:txBody>
+          <a:bodyPr spcFirstLastPara="1" wrap="square" lIns="91425" tIns="91425" rIns="91425" bIns="91425" anchor="t" anchorCtr="0">
+            <a:noAutofit/>
+          </a:bodyPr>
+          <a:lstStyle/>
+          <a:p>
+            <a:pPr marL="0" lvl="0" indent="0" algn="l" rtl="0">
+              <a:lnSpc>
+                <a:spcPct val="100000"/>
+              </a:lnSpc>
+              <a:spcBef>
+                <a:spcPts val="0"/>
+              </a:spcBef>
+              <a:spcAft>
+                <a:spcPts val="0"/>
+              </a:spcAft>
+              <a:buSzPts val="1400"/>
+              <a:buNone/>
+            </a:pPr>
+            <a:endParaRPr/>
+          </a:p>
+        </p:txBody>
+      </p:sp>
+    </p:spTree>
+    <p:extLst>
+      <p:ext uri="{BB962C8B-B14F-4D97-AF65-F5344CB8AC3E}">
+        <p14:creationId xmlns:p14="http://schemas.microsoft.com/office/powerpoint/2010/main" val="4017036706"/>
+      </p:ext>
+    </p:extLst>
+  </p:cSld>
+  <p:clrMapOvr>
+    <a:masterClrMapping/>
+  </p:clrMapOvr>
+</p:notes>
+</file>
+
+<file path=ppt/notesSlides/notesSlide12.xml><?xml version="1.0" encoding="utf-8"?>
+<p:notes xmlns:a="http://schemas.openxmlformats.org/drawingml/2006/main" xmlns:r="http://schemas.openxmlformats.org/officeDocument/2006/relationships" xmlns:p="http://schemas.openxmlformats.org/presentationml/2006/main" showMasterSp="0" showMasterPhAnim="0">
+  <p:cSld>
+    <p:spTree>
+      <p:nvGrpSpPr>
+        <p:cNvPr id="1" name="Shape 113"/>
+        <p:cNvGrpSpPr/>
+        <p:nvPr/>
+      </p:nvGrpSpPr>
+      <p:grpSpPr>
+        <a:xfrm>
+          <a:off x="0" y="0"/>
+          <a:ext cx="0" cy="0"/>
+          <a:chOff x="0" y="0"/>
+          <a:chExt cx="0" cy="0"/>
+        </a:xfrm>
+      </p:grpSpPr>
+      <p:sp>
+        <p:nvSpPr>
+          <p:cNvPr id="114" name="Google Shape;114;p8:notes"/>
+          <p:cNvSpPr>
+            <a:spLocks noGrp="1" noRot="1" noChangeAspect="1"/>
+          </p:cNvSpPr>
+          <p:nvPr>
+            <p:ph type="sldImg" idx="2"/>
+          </p:nvPr>
+        </p:nvSpPr>
+        <p:spPr>
+          <a:xfrm>
+            <a:off x="381000" y="685800"/>
+            <a:ext cx="6096000" cy="3429000"/>
+          </a:xfrm>
+          <a:custGeom>
+            <a:avLst/>
+            <a:gdLst/>
+            <a:ahLst/>
+            <a:cxnLst/>
+            <a:rect l="l" t="t" r="r" b="b"/>
+            <a:pathLst>
+              <a:path w="120000" h="120000" extrusionOk="0">
+                <a:moveTo>
+                  <a:pt x="0" y="0"/>
+                </a:moveTo>
+                <a:lnTo>
+                  <a:pt x="120000" y="0"/>
+                </a:lnTo>
+                <a:lnTo>
+                  <a:pt x="120000" y="120000"/>
+                </a:lnTo>
+                <a:lnTo>
+                  <a:pt x="0" y="120000"/>
+                </a:lnTo>
+                <a:close/>
+              </a:path>
+            </a:pathLst>
+          </a:custGeom>
+          <a:noFill/>
+          <a:ln w="9525" cap="flat" cmpd="sng">
+            <a:solidFill>
+              <a:srgbClr val="000000"/>
+            </a:solidFill>
+            <a:prstDash val="solid"/>
+            <a:round/>
+            <a:headEnd type="none" w="sm" len="sm"/>
+            <a:tailEnd type="none" w="sm" len="sm"/>
+          </a:ln>
+        </p:spPr>
+      </p:sp>
+      <p:sp>
+        <p:nvSpPr>
+          <p:cNvPr id="115" name="Google Shape;115;p8:notes"/>
+          <p:cNvSpPr txBox="1">
+            <a:spLocks noGrp="1"/>
+          </p:cNvSpPr>
+          <p:nvPr>
+            <p:ph type="body" idx="1"/>
+          </p:nvPr>
+        </p:nvSpPr>
+        <p:spPr>
+          <a:xfrm>
+            <a:off x="685800" y="4343400"/>
+            <a:ext cx="5486400" cy="4114800"/>
+          </a:xfrm>
+          <a:prstGeom prst="rect">
+            <a:avLst/>
+          </a:prstGeom>
+          <a:noFill/>
+          <a:ln>
+            <a:noFill/>
+          </a:ln>
+        </p:spPr>
+        <p:txBody>
+          <a:bodyPr spcFirstLastPara="1" wrap="square" lIns="91425" tIns="91425" rIns="91425" bIns="91425" anchor="t" anchorCtr="0">
+            <a:noAutofit/>
+          </a:bodyPr>
+          <a:lstStyle/>
+          <a:p>
+            <a:pPr marL="0" lvl="0" indent="0" algn="l" rtl="0">
+              <a:lnSpc>
+                <a:spcPct val="100000"/>
+              </a:lnSpc>
+              <a:spcBef>
+                <a:spcPts val="0"/>
+              </a:spcBef>
+              <a:spcAft>
+                <a:spcPts val="0"/>
+              </a:spcAft>
+              <a:buSzPts val="1400"/>
+              <a:buNone/>
+            </a:pPr>
+            <a:endParaRPr/>
+          </a:p>
+        </p:txBody>
+      </p:sp>
+    </p:spTree>
+    <p:extLst>
+      <p:ext uri="{BB962C8B-B14F-4D97-AF65-F5344CB8AC3E}">
+        <p14:creationId xmlns:p14="http://schemas.microsoft.com/office/powerpoint/2010/main" val="2834516805"/>
+      </p:ext>
+    </p:extLst>
+  </p:cSld>
+  <p:clrMapOvr>
+    <a:masterClrMapping/>
+  </p:clrMapOvr>
+</p:notes>
+</file>
+
+<file path=ppt/notesSlides/notesSlide13.xml><?xml version="1.0" encoding="utf-8"?>
 <p:notes xmlns:a="http://schemas.openxmlformats.org/drawingml/2006/main" xmlns:r="http://schemas.openxmlformats.org/officeDocument/2006/relationships" xmlns:p="http://schemas.openxmlformats.org/presentationml/2006/main" showMasterSp="0" showMasterPhAnim="0">
   <p:cSld>
     <p:spTree>
@@ -9651,6 +9910,1089 @@
   <p:cSld>
     <p:spTree>
       <p:nvGrpSpPr>
+        <p:cNvPr id="1" name="Shape 172"/>
+        <p:cNvGrpSpPr/>
+        <p:nvPr/>
+      </p:nvGrpSpPr>
+      <p:grpSpPr>
+        <a:xfrm>
+          <a:off x="0" y="0"/>
+          <a:ext cx="0" cy="0"/>
+          <a:chOff x="0" y="0"/>
+          <a:chExt cx="0" cy="0"/>
+        </a:xfrm>
+      </p:grpSpPr>
+      <p:sp>
+        <p:nvSpPr>
+          <p:cNvPr id="173" name="Google Shape;173;p14"/>
+          <p:cNvSpPr txBox="1">
+            <a:spLocks noGrp="1"/>
+          </p:cNvSpPr>
+          <p:nvPr>
+            <p:ph type="title"/>
+          </p:nvPr>
+        </p:nvSpPr>
+        <p:spPr>
+          <a:xfrm>
+            <a:off x="2155104" y="2649037"/>
+            <a:ext cx="4204023" cy="683100"/>
+          </a:xfrm>
+          <a:prstGeom prst="rect">
+            <a:avLst/>
+          </a:prstGeom>
+          <a:noFill/>
+          <a:ln>
+            <a:noFill/>
+          </a:ln>
+        </p:spPr>
+        <p:txBody>
+          <a:bodyPr spcFirstLastPara="1" wrap="square" lIns="91425" tIns="91425" rIns="91425" bIns="91425" anchor="b" anchorCtr="0">
+            <a:noAutofit/>
+          </a:bodyPr>
+          <a:lstStyle/>
+          <a:p>
+            <a:pPr marL="0" lvl="0" indent="0" algn="l" rtl="0">
+              <a:lnSpc>
+                <a:spcPct val="100000"/>
+              </a:lnSpc>
+              <a:spcBef>
+                <a:spcPts val="0"/>
+              </a:spcBef>
+              <a:spcAft>
+                <a:spcPts val="0"/>
+              </a:spcAft>
+              <a:buSzPts val="3600"/>
+              <a:buNone/>
+            </a:pPr>
+            <a:r>
+              <a:rPr lang="en" dirty="0" smtClean="0">
+                <a:solidFill>
+                  <a:srgbClr val="444443"/>
+                </a:solidFill>
+              </a:rPr>
+              <a:t>Modelo</a:t>
+            </a:r>
+            <a:br>
+              <a:rPr lang="en" dirty="0" smtClean="0">
+                <a:solidFill>
+                  <a:srgbClr val="444443"/>
+                </a:solidFill>
+              </a:rPr>
+            </a:br>
+            <a:r>
+              <a:rPr lang="en" dirty="0" smtClean="0">
+                <a:solidFill>
+                  <a:srgbClr val="444443"/>
+                </a:solidFill>
+              </a:rPr>
+              <a:t>Relacional</a:t>
+            </a:r>
+            <a:r>
+              <a:rPr lang="en" dirty="0" smtClean="0">
+                <a:solidFill>
+                  <a:srgbClr val="444443"/>
+                </a:solidFill>
+              </a:rPr>
+              <a:t> </a:t>
+            </a:r>
+            <a:endParaRPr dirty="0">
+              <a:solidFill>
+                <a:srgbClr val="444443"/>
+              </a:solidFill>
+            </a:endParaRPr>
+          </a:p>
+        </p:txBody>
+      </p:sp>
+      <p:sp>
+        <p:nvSpPr>
+          <p:cNvPr id="174" name="Google Shape;174;p14"/>
+          <p:cNvSpPr txBox="1">
+            <a:spLocks noGrp="1"/>
+          </p:cNvSpPr>
+          <p:nvPr>
+            <p:ph type="sldNum" idx="12"/>
+          </p:nvPr>
+        </p:nvSpPr>
+        <p:spPr>
+          <a:xfrm>
+            <a:off x="8555875" y="4576450"/>
+            <a:ext cx="435600" cy="435600"/>
+          </a:xfrm>
+          <a:prstGeom prst="rect">
+            <a:avLst/>
+          </a:prstGeom>
+          <a:noFill/>
+          <a:ln>
+            <a:noFill/>
+          </a:ln>
+        </p:spPr>
+        <p:txBody>
+          <a:bodyPr spcFirstLastPara="1" wrap="square" lIns="91425" tIns="91425" rIns="91425" bIns="91425" anchor="ctr" anchorCtr="0">
+            <a:noAutofit/>
+          </a:bodyPr>
+          <a:lstStyle/>
+          <a:p>
+            <a:pPr marL="0" lvl="0" indent="0" algn="ctr" rtl="0">
+              <a:lnSpc>
+                <a:spcPct val="100000"/>
+              </a:lnSpc>
+              <a:spcBef>
+                <a:spcPts val="0"/>
+              </a:spcBef>
+              <a:spcAft>
+                <a:spcPts val="0"/>
+              </a:spcAft>
+              <a:buSzPts val="1000"/>
+              <a:buNone/>
+            </a:pPr>
+            <a:fld id="{00000000-1234-1234-1234-123412341234}" type="slidenum">
+              <a:rPr lang="en"/>
+              <a:t>11</a:t>
+            </a:fld>
+            <a:endParaRPr/>
+          </a:p>
+        </p:txBody>
+      </p:sp>
+      <p:pic>
+        <p:nvPicPr>
+          <p:cNvPr id="175" name="Google Shape;175;p14"/>
+          <p:cNvPicPr preferRelativeResize="0"/>
+          <p:nvPr/>
+        </p:nvPicPr>
+        <p:blipFill rotWithShape="1">
+          <a:blip r:embed="rId3">
+            <a:alphaModFix/>
+          </a:blip>
+          <a:srcRect/>
+          <a:stretch/>
+        </p:blipFill>
+        <p:spPr>
+          <a:xfrm>
+            <a:off x="6372150" y="1054450"/>
+            <a:ext cx="3034500" cy="3034500"/>
+          </a:xfrm>
+          <a:prstGeom prst="ellipse">
+            <a:avLst/>
+          </a:prstGeom>
+          <a:noFill/>
+          <a:ln w="9525" cap="flat" cmpd="sng">
+            <a:solidFill>
+              <a:srgbClr val="444443"/>
+            </a:solidFill>
+            <a:prstDash val="solid"/>
+            <a:round/>
+            <a:headEnd type="none" w="sm" len="sm"/>
+            <a:tailEnd type="none" w="sm" len="sm"/>
+          </a:ln>
+        </p:spPr>
+      </p:pic>
+      <p:grpSp>
+        <p:nvGrpSpPr>
+          <p:cNvPr id="176" name="Google Shape;176;p14"/>
+          <p:cNvGrpSpPr/>
+          <p:nvPr/>
+        </p:nvGrpSpPr>
+        <p:grpSpPr>
+          <a:xfrm>
+            <a:off x="5853100" y="3068600"/>
+            <a:ext cx="1539600" cy="1539600"/>
+            <a:chOff x="6680825" y="2549350"/>
+            <a:chExt cx="1539600" cy="1539600"/>
+          </a:xfrm>
+        </p:grpSpPr>
+        <p:sp>
+          <p:nvSpPr>
+            <p:cNvPr id="177" name="Google Shape;177;p14"/>
+            <p:cNvSpPr/>
+            <p:nvPr/>
+          </p:nvSpPr>
+          <p:spPr>
+            <a:xfrm>
+              <a:off x="6825669" y="2694194"/>
+              <a:ext cx="1249800" cy="1249800"/>
+            </a:xfrm>
+            <a:prstGeom prst="ellipse">
+              <a:avLst/>
+            </a:prstGeom>
+            <a:solidFill>
+              <a:srgbClr val="444443"/>
+            </a:solidFill>
+            <a:ln>
+              <a:noFill/>
+            </a:ln>
+          </p:spPr>
+          <p:txBody>
+            <a:bodyPr spcFirstLastPara="1" wrap="square" lIns="91425" tIns="91425" rIns="91425" bIns="91425" anchor="ctr" anchorCtr="0">
+              <a:noAutofit/>
+            </a:bodyPr>
+            <a:lstStyle/>
+            <a:p>
+              <a:pPr marL="0" marR="0" lvl="0" indent="0" algn="l" rtl="0">
+                <a:lnSpc>
+                  <a:spcPct val="100000"/>
+                </a:lnSpc>
+                <a:spcBef>
+                  <a:spcPts val="0"/>
+                </a:spcBef>
+                <a:spcAft>
+                  <a:spcPts val="0"/>
+                </a:spcAft>
+                <a:buClr>
+                  <a:srgbClr val="000000"/>
+                </a:buClr>
+                <a:buSzPts val="1400"/>
+                <a:buFont typeface="Arial"/>
+                <a:buNone/>
+              </a:pPr>
+              <a:endParaRPr sz="1400" b="0" i="0" u="none" strike="noStrike" cap="none">
+                <a:solidFill>
+                  <a:srgbClr val="000000"/>
+                </a:solidFill>
+                <a:latin typeface="Arial"/>
+                <a:ea typeface="Arial"/>
+                <a:cs typeface="Arial"/>
+                <a:sym typeface="Arial"/>
+              </a:endParaRPr>
+            </a:p>
+          </p:txBody>
+        </p:sp>
+        <p:sp>
+          <p:nvSpPr>
+            <p:cNvPr id="178" name="Google Shape;178;p14"/>
+            <p:cNvSpPr/>
+            <p:nvPr/>
+          </p:nvSpPr>
+          <p:spPr>
+            <a:xfrm>
+              <a:off x="6894850" y="2763375"/>
+              <a:ext cx="1111200" cy="1111200"/>
+            </a:xfrm>
+            <a:prstGeom prst="ellipse">
+              <a:avLst/>
+            </a:prstGeom>
+            <a:solidFill>
+              <a:srgbClr val="444443"/>
+            </a:solidFill>
+            <a:ln>
+              <a:noFill/>
+            </a:ln>
+          </p:spPr>
+          <p:txBody>
+            <a:bodyPr spcFirstLastPara="1" wrap="square" lIns="91425" tIns="91425" rIns="91425" bIns="91425" anchor="ctr" anchorCtr="0">
+              <a:noAutofit/>
+            </a:bodyPr>
+            <a:lstStyle/>
+            <a:p>
+              <a:pPr marL="0" marR="0" lvl="0" indent="0" algn="l" rtl="0">
+                <a:lnSpc>
+                  <a:spcPct val="100000"/>
+                </a:lnSpc>
+                <a:spcBef>
+                  <a:spcPts val="0"/>
+                </a:spcBef>
+                <a:spcAft>
+                  <a:spcPts val="0"/>
+                </a:spcAft>
+                <a:buClr>
+                  <a:srgbClr val="000000"/>
+                </a:buClr>
+                <a:buSzPts val="1400"/>
+                <a:buFont typeface="Arial"/>
+                <a:buNone/>
+              </a:pPr>
+              <a:endParaRPr sz="1400" b="0" i="0" u="none" strike="noStrike" cap="none">
+                <a:solidFill>
+                  <a:srgbClr val="000000"/>
+                </a:solidFill>
+                <a:latin typeface="Arial"/>
+                <a:ea typeface="Arial"/>
+                <a:cs typeface="Arial"/>
+                <a:sym typeface="Arial"/>
+              </a:endParaRPr>
+            </a:p>
+          </p:txBody>
+        </p:sp>
+        <p:sp>
+          <p:nvSpPr>
+            <p:cNvPr id="179" name="Google Shape;179;p14"/>
+            <p:cNvSpPr/>
+            <p:nvPr/>
+          </p:nvSpPr>
+          <p:spPr>
+            <a:xfrm>
+              <a:off x="6680825" y="2549350"/>
+              <a:ext cx="1539600" cy="1539600"/>
+            </a:xfrm>
+            <a:prstGeom prst="donut">
+              <a:avLst>
+                <a:gd name="adj" fmla="val 675"/>
+              </a:avLst>
+            </a:prstGeom>
+            <a:solidFill>
+              <a:srgbClr val="444443"/>
+            </a:solidFill>
+            <a:ln>
+              <a:noFill/>
+            </a:ln>
+          </p:spPr>
+          <p:txBody>
+            <a:bodyPr spcFirstLastPara="1" wrap="square" lIns="91425" tIns="91425" rIns="91425" bIns="91425" anchor="ctr" anchorCtr="0">
+              <a:noAutofit/>
+            </a:bodyPr>
+            <a:lstStyle/>
+            <a:p>
+              <a:pPr marL="0" marR="0" lvl="0" indent="0" algn="l" rtl="0">
+                <a:lnSpc>
+                  <a:spcPct val="100000"/>
+                </a:lnSpc>
+                <a:spcBef>
+                  <a:spcPts val="0"/>
+                </a:spcBef>
+                <a:spcAft>
+                  <a:spcPts val="0"/>
+                </a:spcAft>
+                <a:buClr>
+                  <a:srgbClr val="000000"/>
+                </a:buClr>
+                <a:buSzPts val="1400"/>
+                <a:buFont typeface="Arial"/>
+                <a:buNone/>
+              </a:pPr>
+              <a:endParaRPr sz="1400" b="0" i="0" u="none" strike="noStrike" cap="none">
+                <a:solidFill>
+                  <a:srgbClr val="000000"/>
+                </a:solidFill>
+                <a:latin typeface="Arial"/>
+                <a:ea typeface="Arial"/>
+                <a:cs typeface="Arial"/>
+                <a:sym typeface="Arial"/>
+              </a:endParaRPr>
+            </a:p>
+          </p:txBody>
+        </p:sp>
+      </p:grpSp>
+      <p:grpSp>
+        <p:nvGrpSpPr>
+          <p:cNvPr id="180" name="Google Shape;180;p14"/>
+          <p:cNvGrpSpPr/>
+          <p:nvPr/>
+        </p:nvGrpSpPr>
+        <p:grpSpPr>
+          <a:xfrm>
+            <a:off x="6215904" y="3494823"/>
+            <a:ext cx="806175" cy="731446"/>
+            <a:chOff x="4456875" y="2635825"/>
+            <a:chExt cx="481825" cy="451700"/>
+          </a:xfrm>
+        </p:grpSpPr>
+        <p:sp>
+          <p:nvSpPr>
+            <p:cNvPr id="181" name="Google Shape;181;p14"/>
+            <p:cNvSpPr/>
+            <p:nvPr/>
+          </p:nvSpPr>
+          <p:spPr>
+            <a:xfrm>
+              <a:off x="4542475" y="3031050"/>
+              <a:ext cx="189725" cy="56475"/>
+            </a:xfrm>
+            <a:custGeom>
+              <a:avLst/>
+              <a:gdLst/>
+              <a:ahLst/>
+              <a:cxnLst/>
+              <a:rect l="l" t="t" r="r" b="b"/>
+              <a:pathLst>
+                <a:path w="7589" h="2259" extrusionOk="0">
+                  <a:moveTo>
+                    <a:pt x="2792" y="0"/>
+                  </a:moveTo>
+                  <a:lnTo>
+                    <a:pt x="2415" y="1130"/>
+                  </a:lnTo>
+                  <a:lnTo>
+                    <a:pt x="567" y="1130"/>
+                  </a:lnTo>
+                  <a:cubicBezTo>
+                    <a:pt x="253" y="1130"/>
+                    <a:pt x="0" y="1383"/>
+                    <a:pt x="0" y="1696"/>
+                  </a:cubicBezTo>
+                  <a:cubicBezTo>
+                    <a:pt x="0" y="2006"/>
+                    <a:pt x="253" y="2259"/>
+                    <a:pt x="567" y="2259"/>
+                  </a:cubicBezTo>
+                  <a:lnTo>
+                    <a:pt x="7589" y="2259"/>
+                  </a:lnTo>
+                  <a:cubicBezTo>
+                    <a:pt x="7101" y="1831"/>
+                    <a:pt x="6821" y="1214"/>
+                    <a:pt x="6821" y="567"/>
+                  </a:cubicBezTo>
+                  <a:lnTo>
+                    <a:pt x="6821" y="0"/>
+                  </a:lnTo>
+                  <a:close/>
+                </a:path>
+              </a:pathLst>
+            </a:custGeom>
+            <a:solidFill>
+              <a:schemeClr val="lt1"/>
+            </a:solidFill>
+            <a:ln>
+              <a:noFill/>
+            </a:ln>
+          </p:spPr>
+          <p:txBody>
+            <a:bodyPr spcFirstLastPara="1" wrap="square" lIns="91425" tIns="91425" rIns="91425" bIns="91425" anchor="ctr" anchorCtr="0">
+              <a:noAutofit/>
+            </a:bodyPr>
+            <a:lstStyle/>
+            <a:p>
+              <a:pPr marL="0" marR="0" lvl="0" indent="0" algn="l" rtl="0">
+                <a:lnSpc>
+                  <a:spcPct val="100000"/>
+                </a:lnSpc>
+                <a:spcBef>
+                  <a:spcPts val="0"/>
+                </a:spcBef>
+                <a:spcAft>
+                  <a:spcPts val="0"/>
+                </a:spcAft>
+                <a:buClr>
+                  <a:srgbClr val="000000"/>
+                </a:buClr>
+                <a:buSzPts val="1400"/>
+                <a:buFont typeface="Arial"/>
+                <a:buNone/>
+              </a:pPr>
+              <a:endParaRPr sz="1400" b="0" i="0" u="none" strike="noStrike" cap="none">
+                <a:solidFill>
+                  <a:srgbClr val="435D74"/>
+                </a:solidFill>
+                <a:latin typeface="Arial"/>
+                <a:ea typeface="Arial"/>
+                <a:cs typeface="Arial"/>
+                <a:sym typeface="Arial"/>
+              </a:endParaRPr>
+            </a:p>
+          </p:txBody>
+        </p:sp>
+        <p:sp>
+          <p:nvSpPr>
+            <p:cNvPr id="182" name="Google Shape;182;p14"/>
+            <p:cNvSpPr/>
+            <p:nvPr/>
+          </p:nvSpPr>
+          <p:spPr>
+            <a:xfrm>
+              <a:off x="4456875" y="2946350"/>
+              <a:ext cx="256125" cy="56500"/>
+            </a:xfrm>
+            <a:custGeom>
+              <a:avLst/>
+              <a:gdLst/>
+              <a:ahLst/>
+              <a:cxnLst/>
+              <a:rect l="l" t="t" r="r" b="b"/>
+              <a:pathLst>
+                <a:path w="10245" h="2260" extrusionOk="0">
+                  <a:moveTo>
+                    <a:pt x="1" y="1"/>
+                  </a:moveTo>
+                  <a:lnTo>
+                    <a:pt x="1" y="567"/>
+                  </a:lnTo>
+                  <a:cubicBezTo>
+                    <a:pt x="1" y="1500"/>
+                    <a:pt x="756" y="2259"/>
+                    <a:pt x="1693" y="2259"/>
+                  </a:cubicBezTo>
+                  <a:lnTo>
+                    <a:pt x="10245" y="2259"/>
+                  </a:lnTo>
+                  <a:lnTo>
+                    <a:pt x="10245" y="1"/>
+                  </a:lnTo>
+                  <a:close/>
+                </a:path>
+              </a:pathLst>
+            </a:custGeom>
+            <a:solidFill>
+              <a:schemeClr val="lt1"/>
+            </a:solidFill>
+            <a:ln>
+              <a:noFill/>
+            </a:ln>
+          </p:spPr>
+          <p:txBody>
+            <a:bodyPr spcFirstLastPara="1" wrap="square" lIns="91425" tIns="91425" rIns="91425" bIns="91425" anchor="ctr" anchorCtr="0">
+              <a:noAutofit/>
+            </a:bodyPr>
+            <a:lstStyle/>
+            <a:p>
+              <a:pPr marL="0" marR="0" lvl="0" indent="0" algn="l" rtl="0">
+                <a:lnSpc>
+                  <a:spcPct val="100000"/>
+                </a:lnSpc>
+                <a:spcBef>
+                  <a:spcPts val="0"/>
+                </a:spcBef>
+                <a:spcAft>
+                  <a:spcPts val="0"/>
+                </a:spcAft>
+                <a:buClr>
+                  <a:srgbClr val="000000"/>
+                </a:buClr>
+                <a:buSzPts val="1400"/>
+                <a:buFont typeface="Arial"/>
+                <a:buNone/>
+              </a:pPr>
+              <a:endParaRPr sz="1400" b="0" i="0" u="none" strike="noStrike" cap="none">
+                <a:solidFill>
+                  <a:srgbClr val="435D74"/>
+                </a:solidFill>
+                <a:latin typeface="Arial"/>
+                <a:ea typeface="Arial"/>
+                <a:cs typeface="Arial"/>
+                <a:sym typeface="Arial"/>
+              </a:endParaRPr>
+            </a:p>
+          </p:txBody>
+        </p:sp>
+        <p:sp>
+          <p:nvSpPr>
+            <p:cNvPr id="183" name="Google Shape;183;p14"/>
+            <p:cNvSpPr/>
+            <p:nvPr/>
+          </p:nvSpPr>
+          <p:spPr>
+            <a:xfrm>
+              <a:off x="4741225" y="2861675"/>
+              <a:ext cx="169400" cy="141175"/>
+            </a:xfrm>
+            <a:custGeom>
+              <a:avLst/>
+              <a:gdLst/>
+              <a:ahLst/>
+              <a:cxnLst/>
+              <a:rect l="l" t="t" r="r" b="b"/>
+              <a:pathLst>
+                <a:path w="6776" h="5647" extrusionOk="0">
+                  <a:moveTo>
+                    <a:pt x="0" y="0"/>
+                  </a:moveTo>
+                  <a:lnTo>
+                    <a:pt x="0" y="5646"/>
+                  </a:lnTo>
+                  <a:lnTo>
+                    <a:pt x="6775" y="5646"/>
+                  </a:lnTo>
+                  <a:lnTo>
+                    <a:pt x="6775" y="0"/>
+                  </a:lnTo>
+                  <a:close/>
+                </a:path>
+              </a:pathLst>
+            </a:custGeom>
+            <a:solidFill>
+              <a:schemeClr val="lt1"/>
+            </a:solidFill>
+            <a:ln>
+              <a:noFill/>
+            </a:ln>
+          </p:spPr>
+          <p:txBody>
+            <a:bodyPr spcFirstLastPara="1" wrap="square" lIns="91425" tIns="91425" rIns="91425" bIns="91425" anchor="ctr" anchorCtr="0">
+              <a:noAutofit/>
+            </a:bodyPr>
+            <a:lstStyle/>
+            <a:p>
+              <a:pPr marL="0" marR="0" lvl="0" indent="0" algn="l" rtl="0">
+                <a:lnSpc>
+                  <a:spcPct val="100000"/>
+                </a:lnSpc>
+                <a:spcBef>
+                  <a:spcPts val="0"/>
+                </a:spcBef>
+                <a:spcAft>
+                  <a:spcPts val="0"/>
+                </a:spcAft>
+                <a:buClr>
+                  <a:srgbClr val="000000"/>
+                </a:buClr>
+                <a:buSzPts val="1400"/>
+                <a:buFont typeface="Arial"/>
+                <a:buNone/>
+              </a:pPr>
+              <a:endParaRPr sz="1400" b="0" i="0" u="none" strike="noStrike" cap="none">
+                <a:solidFill>
+                  <a:srgbClr val="435D74"/>
+                </a:solidFill>
+                <a:latin typeface="Arial"/>
+                <a:ea typeface="Arial"/>
+                <a:cs typeface="Arial"/>
+                <a:sym typeface="Arial"/>
+              </a:endParaRPr>
+            </a:p>
+          </p:txBody>
+        </p:sp>
+        <p:sp>
+          <p:nvSpPr>
+            <p:cNvPr id="184" name="Google Shape;184;p14"/>
+            <p:cNvSpPr/>
+            <p:nvPr/>
+          </p:nvSpPr>
+          <p:spPr>
+            <a:xfrm>
+              <a:off x="4741225" y="3031050"/>
+              <a:ext cx="169400" cy="42400"/>
+            </a:xfrm>
+            <a:custGeom>
+              <a:avLst/>
+              <a:gdLst/>
+              <a:ahLst/>
+              <a:cxnLst/>
+              <a:rect l="l" t="t" r="r" b="b"/>
+              <a:pathLst>
+                <a:path w="6776" h="1696" extrusionOk="0">
+                  <a:moveTo>
+                    <a:pt x="0" y="0"/>
+                  </a:moveTo>
+                  <a:lnTo>
+                    <a:pt x="0" y="567"/>
+                  </a:lnTo>
+                  <a:cubicBezTo>
+                    <a:pt x="0" y="1190"/>
+                    <a:pt x="506" y="1696"/>
+                    <a:pt x="1129" y="1696"/>
+                  </a:cubicBezTo>
+                  <a:lnTo>
+                    <a:pt x="5646" y="1696"/>
+                  </a:lnTo>
+                  <a:cubicBezTo>
+                    <a:pt x="6270" y="1696"/>
+                    <a:pt x="6775" y="1190"/>
+                    <a:pt x="6775" y="567"/>
+                  </a:cubicBezTo>
+                  <a:lnTo>
+                    <a:pt x="6775" y="0"/>
+                  </a:lnTo>
+                  <a:close/>
+                </a:path>
+              </a:pathLst>
+            </a:custGeom>
+            <a:solidFill>
+              <a:schemeClr val="lt1"/>
+            </a:solidFill>
+            <a:ln>
+              <a:noFill/>
+            </a:ln>
+          </p:spPr>
+          <p:txBody>
+            <a:bodyPr spcFirstLastPara="1" wrap="square" lIns="91425" tIns="91425" rIns="91425" bIns="91425" anchor="ctr" anchorCtr="0">
+              <a:noAutofit/>
+            </a:bodyPr>
+            <a:lstStyle/>
+            <a:p>
+              <a:pPr marL="0" marR="0" lvl="0" indent="0" algn="l" rtl="0">
+                <a:lnSpc>
+                  <a:spcPct val="100000"/>
+                </a:lnSpc>
+                <a:spcBef>
+                  <a:spcPts val="0"/>
+                </a:spcBef>
+                <a:spcAft>
+                  <a:spcPts val="0"/>
+                </a:spcAft>
+                <a:buClr>
+                  <a:srgbClr val="000000"/>
+                </a:buClr>
+                <a:buSzPts val="1400"/>
+                <a:buFont typeface="Arial"/>
+                <a:buNone/>
+              </a:pPr>
+              <a:endParaRPr sz="1400" b="0" i="0" u="none" strike="noStrike" cap="none">
+                <a:solidFill>
+                  <a:srgbClr val="435D74"/>
+                </a:solidFill>
+                <a:latin typeface="Arial"/>
+                <a:ea typeface="Arial"/>
+                <a:cs typeface="Arial"/>
+                <a:sym typeface="Arial"/>
+              </a:endParaRPr>
+            </a:p>
+          </p:txBody>
+        </p:sp>
+        <p:sp>
+          <p:nvSpPr>
+            <p:cNvPr id="185" name="Google Shape;185;p14"/>
+            <p:cNvSpPr/>
+            <p:nvPr/>
+          </p:nvSpPr>
+          <p:spPr>
+            <a:xfrm>
+              <a:off x="4456875" y="2635825"/>
+              <a:ext cx="481825" cy="282325"/>
+            </a:xfrm>
+            <a:custGeom>
+              <a:avLst/>
+              <a:gdLst/>
+              <a:ahLst/>
+              <a:cxnLst/>
+              <a:rect l="l" t="t" r="r" b="b"/>
+              <a:pathLst>
+                <a:path w="19273" h="11293" extrusionOk="0">
+                  <a:moveTo>
+                    <a:pt x="1693" y="0"/>
+                  </a:moveTo>
+                  <a:cubicBezTo>
+                    <a:pt x="756" y="0"/>
+                    <a:pt x="1" y="759"/>
+                    <a:pt x="1" y="1696"/>
+                  </a:cubicBezTo>
+                  <a:lnTo>
+                    <a:pt x="1" y="11293"/>
+                  </a:lnTo>
+                  <a:lnTo>
+                    <a:pt x="10245" y="11293"/>
+                  </a:lnTo>
+                  <a:lnTo>
+                    <a:pt x="10245" y="7342"/>
+                  </a:lnTo>
+                  <a:cubicBezTo>
+                    <a:pt x="10245" y="6092"/>
+                    <a:pt x="11257" y="5083"/>
+                    <a:pt x="12503" y="5083"/>
+                  </a:cubicBezTo>
+                  <a:lnTo>
+                    <a:pt x="17020" y="5083"/>
+                  </a:lnTo>
+                  <a:cubicBezTo>
+                    <a:pt x="18201" y="5083"/>
+                    <a:pt x="19179" y="5993"/>
+                    <a:pt x="19273" y="7167"/>
+                  </a:cubicBezTo>
+                  <a:lnTo>
+                    <a:pt x="19273" y="1696"/>
+                  </a:lnTo>
+                  <a:cubicBezTo>
+                    <a:pt x="19270" y="759"/>
+                    <a:pt x="18514" y="0"/>
+                    <a:pt x="17577" y="0"/>
+                  </a:cubicBezTo>
+                  <a:close/>
+                </a:path>
+              </a:pathLst>
+            </a:custGeom>
+            <a:solidFill>
+              <a:schemeClr val="lt1"/>
+            </a:solidFill>
+            <a:ln>
+              <a:noFill/>
+            </a:ln>
+          </p:spPr>
+          <p:txBody>
+            <a:bodyPr spcFirstLastPara="1" wrap="square" lIns="91425" tIns="91425" rIns="91425" bIns="91425" anchor="ctr" anchorCtr="0">
+              <a:noAutofit/>
+            </a:bodyPr>
+            <a:lstStyle/>
+            <a:p>
+              <a:pPr marL="0" marR="0" lvl="0" indent="0" algn="l" rtl="0">
+                <a:lnSpc>
+                  <a:spcPct val="100000"/>
+                </a:lnSpc>
+                <a:spcBef>
+                  <a:spcPts val="0"/>
+                </a:spcBef>
+                <a:spcAft>
+                  <a:spcPts val="0"/>
+                </a:spcAft>
+                <a:buClr>
+                  <a:srgbClr val="000000"/>
+                </a:buClr>
+                <a:buSzPts val="1400"/>
+                <a:buFont typeface="Arial"/>
+                <a:buNone/>
+              </a:pPr>
+              <a:endParaRPr sz="1400" b="0" i="0" u="none" strike="noStrike" cap="none">
+                <a:solidFill>
+                  <a:srgbClr val="435D74"/>
+                </a:solidFill>
+                <a:latin typeface="Arial"/>
+                <a:ea typeface="Arial"/>
+                <a:cs typeface="Arial"/>
+                <a:sym typeface="Arial"/>
+              </a:endParaRPr>
+            </a:p>
+          </p:txBody>
+        </p:sp>
+        <p:sp>
+          <p:nvSpPr>
+            <p:cNvPr id="186" name="Google Shape;186;p14"/>
+            <p:cNvSpPr/>
+            <p:nvPr/>
+          </p:nvSpPr>
+          <p:spPr>
+            <a:xfrm>
+              <a:off x="4741225" y="2791125"/>
+              <a:ext cx="169400" cy="42325"/>
+            </a:xfrm>
+            <a:custGeom>
+              <a:avLst/>
+              <a:gdLst/>
+              <a:ahLst/>
+              <a:cxnLst/>
+              <a:rect l="l" t="t" r="r" b="b"/>
+              <a:pathLst>
+                <a:path w="6776" h="1693" extrusionOk="0">
+                  <a:moveTo>
+                    <a:pt x="1129" y="1"/>
+                  </a:moveTo>
+                  <a:cubicBezTo>
+                    <a:pt x="506" y="1"/>
+                    <a:pt x="0" y="503"/>
+                    <a:pt x="0" y="1130"/>
+                  </a:cubicBezTo>
+                  <a:lnTo>
+                    <a:pt x="0" y="1693"/>
+                  </a:lnTo>
+                  <a:lnTo>
+                    <a:pt x="6775" y="1693"/>
+                  </a:lnTo>
+                  <a:lnTo>
+                    <a:pt x="6775" y="1130"/>
+                  </a:lnTo>
+                  <a:cubicBezTo>
+                    <a:pt x="6775" y="503"/>
+                    <a:pt x="6270" y="1"/>
+                    <a:pt x="5646" y="1"/>
+                  </a:cubicBezTo>
+                  <a:close/>
+                </a:path>
+              </a:pathLst>
+            </a:custGeom>
+            <a:solidFill>
+              <a:schemeClr val="lt1"/>
+            </a:solidFill>
+            <a:ln>
+              <a:noFill/>
+            </a:ln>
+          </p:spPr>
+          <p:txBody>
+            <a:bodyPr spcFirstLastPara="1" wrap="square" lIns="91425" tIns="91425" rIns="91425" bIns="91425" anchor="ctr" anchorCtr="0">
+              <a:noAutofit/>
+            </a:bodyPr>
+            <a:lstStyle/>
+            <a:p>
+              <a:pPr marL="0" marR="0" lvl="0" indent="0" algn="l" rtl="0">
+                <a:lnSpc>
+                  <a:spcPct val="100000"/>
+                </a:lnSpc>
+                <a:spcBef>
+                  <a:spcPts val="0"/>
+                </a:spcBef>
+                <a:spcAft>
+                  <a:spcPts val="0"/>
+                </a:spcAft>
+                <a:buClr>
+                  <a:srgbClr val="000000"/>
+                </a:buClr>
+                <a:buSzPts val="1400"/>
+                <a:buFont typeface="Arial"/>
+                <a:buNone/>
+              </a:pPr>
+              <a:endParaRPr sz="1400" b="0" i="0" u="none" strike="noStrike" cap="none">
+                <a:solidFill>
+                  <a:srgbClr val="435D74"/>
+                </a:solidFill>
+                <a:latin typeface="Arial"/>
+                <a:ea typeface="Arial"/>
+                <a:cs typeface="Arial"/>
+                <a:sym typeface="Arial"/>
+              </a:endParaRPr>
+            </a:p>
+          </p:txBody>
+        </p:sp>
+      </p:grpSp>
+      <p:pic>
+        <p:nvPicPr>
+          <p:cNvPr id="187" name="Google Shape;187;p14"/>
+          <p:cNvPicPr preferRelativeResize="0"/>
+          <p:nvPr/>
+        </p:nvPicPr>
+        <p:blipFill rotWithShape="1">
+          <a:blip r:embed="rId4">
+            <a:alphaModFix/>
+          </a:blip>
+          <a:srcRect/>
+          <a:stretch/>
+        </p:blipFill>
+        <p:spPr>
+          <a:xfrm>
+            <a:off x="528499" y="1255994"/>
+            <a:ext cx="399969" cy="535523"/>
+          </a:xfrm>
+          <a:prstGeom prst="rect">
+            <a:avLst/>
+          </a:prstGeom>
+          <a:noFill/>
+          <a:ln>
+            <a:noFill/>
+          </a:ln>
+        </p:spPr>
+      </p:pic>
+    </p:spTree>
+    <p:extLst>
+      <p:ext uri="{BB962C8B-B14F-4D97-AF65-F5344CB8AC3E}">
+        <p14:creationId xmlns:p14="http://schemas.microsoft.com/office/powerpoint/2010/main" val="1454172911"/>
+      </p:ext>
+    </p:extLst>
+  </p:cSld>
+  <p:clrMapOvr>
+    <a:masterClrMapping/>
+  </p:clrMapOvr>
+</p:sld>
+</file>
+
+<file path=ppt/slides/slide12.xml><?xml version="1.0" encoding="utf-8"?>
+<p:sld xmlns:a="http://schemas.openxmlformats.org/drawingml/2006/main" xmlns:r="http://schemas.openxmlformats.org/officeDocument/2006/relationships" xmlns:p="http://schemas.openxmlformats.org/presentationml/2006/main">
+  <p:cSld>
+    <p:spTree>
+      <p:nvGrpSpPr>
+        <p:cNvPr id="1" name="Shape 116"/>
+        <p:cNvGrpSpPr/>
+        <p:nvPr/>
+      </p:nvGrpSpPr>
+      <p:grpSpPr>
+        <a:xfrm>
+          <a:off x="0" y="0"/>
+          <a:ext cx="0" cy="0"/>
+          <a:chOff x="0" y="0"/>
+          <a:chExt cx="0" cy="0"/>
+        </a:xfrm>
+      </p:grpSpPr>
+      <p:sp>
+        <p:nvSpPr>
+          <p:cNvPr id="118" name="Google Shape;118;p8"/>
+          <p:cNvSpPr txBox="1">
+            <a:spLocks noGrp="1"/>
+          </p:cNvSpPr>
+          <p:nvPr>
+            <p:ph type="sldNum" idx="12"/>
+          </p:nvPr>
+        </p:nvSpPr>
+        <p:spPr>
+          <a:xfrm>
+            <a:off x="8555875" y="4576450"/>
+            <a:ext cx="435600" cy="435600"/>
+          </a:xfrm>
+          <a:prstGeom prst="rect">
+            <a:avLst/>
+          </a:prstGeom>
+          <a:noFill/>
+          <a:ln>
+            <a:noFill/>
+          </a:ln>
+        </p:spPr>
+        <p:txBody>
+          <a:bodyPr spcFirstLastPara="1" wrap="square" lIns="91425" tIns="91425" rIns="91425" bIns="91425" anchor="ctr" anchorCtr="0">
+            <a:noAutofit/>
+          </a:bodyPr>
+          <a:lstStyle/>
+          <a:p>
+            <a:pPr marL="0" lvl="0" indent="0" algn="ctr" rtl="0">
+              <a:lnSpc>
+                <a:spcPct val="100000"/>
+              </a:lnSpc>
+              <a:spcBef>
+                <a:spcPts val="0"/>
+              </a:spcBef>
+              <a:spcAft>
+                <a:spcPts val="0"/>
+              </a:spcAft>
+              <a:buSzPts val="1000"/>
+              <a:buNone/>
+            </a:pPr>
+            <a:fld id="{00000000-1234-1234-1234-123412341234}" type="slidenum">
+              <a:rPr lang="en"/>
+              <a:t>12</a:t>
+            </a:fld>
+            <a:endParaRPr/>
+          </a:p>
+        </p:txBody>
+      </p:sp>
+      <p:pic>
+        <p:nvPicPr>
+          <p:cNvPr id="2" name="Imagen 1"/>
+          <p:cNvPicPr>
+            <a:picLocks noChangeAspect="1"/>
+          </p:cNvPicPr>
+          <p:nvPr/>
+        </p:nvPicPr>
+        <p:blipFill>
+          <a:blip r:embed="rId3"/>
+          <a:stretch>
+            <a:fillRect/>
+          </a:stretch>
+        </p:blipFill>
+        <p:spPr>
+          <a:xfrm>
+            <a:off x="1161771" y="521035"/>
+            <a:ext cx="6836672" cy="3990144"/>
+          </a:xfrm>
+          <a:prstGeom prst="rect">
+            <a:avLst/>
+          </a:prstGeom>
+        </p:spPr>
+      </p:pic>
+      <p:pic>
+        <p:nvPicPr>
+          <p:cNvPr id="120" name="Google Shape;120;p8"/>
+          <p:cNvPicPr preferRelativeResize="0"/>
+          <p:nvPr/>
+        </p:nvPicPr>
+        <p:blipFill rotWithShape="1">
+          <a:blip r:embed="rId4">
+            <a:alphaModFix/>
+          </a:blip>
+          <a:srcRect/>
+          <a:stretch/>
+        </p:blipFill>
+        <p:spPr>
+          <a:xfrm>
+            <a:off x="7998443" y="246184"/>
+            <a:ext cx="670859" cy="898220"/>
+          </a:xfrm>
+          <a:prstGeom prst="rect">
+            <a:avLst/>
+          </a:prstGeom>
+          <a:noFill/>
+          <a:ln>
+            <a:noFill/>
+          </a:ln>
+        </p:spPr>
+      </p:pic>
+    </p:spTree>
+    <p:extLst>
+      <p:ext uri="{BB962C8B-B14F-4D97-AF65-F5344CB8AC3E}">
+        <p14:creationId xmlns:p14="http://schemas.microsoft.com/office/powerpoint/2010/main" val="905512828"/>
+      </p:ext>
+    </p:extLst>
+  </p:cSld>
+  <p:clrMapOvr>
+    <a:masterClrMapping/>
+  </p:clrMapOvr>
+</p:sld>
+</file>
+
+<file path=ppt/slides/slide13.xml><?xml version="1.0" encoding="utf-8"?>
+<p:sld xmlns:a="http://schemas.openxmlformats.org/drawingml/2006/main" xmlns:r="http://schemas.openxmlformats.org/officeDocument/2006/relationships" xmlns:p="http://schemas.openxmlformats.org/presentationml/2006/main">
+  <p:cSld>
+    <p:spTree>
+      <p:nvGrpSpPr>
         <p:cNvPr id="1" name="Shape 200"/>
         <p:cNvGrpSpPr/>
         <p:nvPr/>
@@ -10028,6 +11370,18 @@
               </a:rPr>
               <a:t>Jean Paul Garcia</a:t>
             </a:r>
+            <a:r>
+              <a:rPr lang="en" sz="1400" b="0" i="0" u="none" strike="noStrike" cap="none" dirty="0">
+                <a:solidFill>
+                  <a:srgbClr val="000000"/>
+                </a:solidFill>
+                <a:latin typeface="Poppins"/>
+                <a:ea typeface="Poppins"/>
+                <a:cs typeface="Poppins"/>
+                <a:sym typeface="Poppins"/>
+              </a:rPr>
+              <a:t/>
+            </a:r>
             <a:br>
               <a:rPr lang="en" sz="1400" b="0" i="0" u="none" strike="noStrike" cap="none" dirty="0">
                 <a:solidFill>
@@ -10265,6 +11619,18 @@
                 <a:sym typeface="Poppins"/>
               </a:rPr>
               <a:t>Miguel Angel Gil</a:t>
+            </a:r>
+            <a:r>
+              <a:rPr lang="en" sz="1400" b="0" i="0" u="none" strike="noStrike" cap="none" dirty="0">
+                <a:solidFill>
+                  <a:srgbClr val="000000"/>
+                </a:solidFill>
+                <a:latin typeface="Poppins"/>
+                <a:ea typeface="Poppins"/>
+                <a:cs typeface="Poppins"/>
+                <a:sym typeface="Poppins"/>
+              </a:rPr>
+              <a:t/>
             </a:r>
             <a:br>
               <a:rPr lang="en" sz="1400" b="0" i="0" u="none" strike="noStrike" cap="none" dirty="0">
@@ -13532,7 +14898,7 @@
               <a:buNone/>
             </a:pPr>
             <a:r>
-              <a:rPr lang="en" sz="900" b="0" i="0" u="none" strike="noStrike" cap="none" dirty="0">
+              <a:rPr lang="en" sz="900" b="0" i="0" u="none" strike="noStrike" cap="none" dirty="0" smtClean="0">
                 <a:solidFill>
                   <a:schemeClr val="dk2"/>
                 </a:solidFill>
@@ -13541,7 +14907,7 @@
                 <a:cs typeface="Poppins"/>
                 <a:sym typeface="Poppins"/>
               </a:rPr>
-              <a:t>Aprobar créditos.</a:t>
+              <a:t>Registrar préstamos.</a:t>
             </a:r>
             <a:endParaRPr dirty="0"/>
           </a:p>
@@ -13669,7 +15035,19 @@
                 <a:cs typeface="Poppins"/>
                 <a:sym typeface="Poppins"/>
               </a:rPr>
-              <a:t>Generar reportes.</a:t>
+              <a:t>Generar </a:t>
+            </a:r>
+            <a:r>
+              <a:rPr lang="en" sz="900" b="0" i="0" u="none" strike="noStrike" cap="none" dirty="0" smtClean="0">
+                <a:solidFill>
+                  <a:schemeClr val="dk2"/>
+                </a:solidFill>
+                <a:latin typeface="Poppins"/>
+                <a:ea typeface="Poppins"/>
+                <a:cs typeface="Poppins"/>
+                <a:sym typeface="Poppins"/>
+              </a:rPr>
+              <a:t>reportes de pagos.</a:t>
             </a:r>
             <a:endParaRPr dirty="0"/>
           </a:p>
@@ -13772,19 +15150,11 @@
               <a:buClr>
                 <a:srgbClr val="000000"/>
               </a:buClr>
-              <a:buSzPts val="1200"/>
+              <a:buSzPts val="900"/>
               <a:buFont typeface="Arial"/>
               <a:buNone/>
             </a:pPr>
-            <a:endParaRPr sz="1400" b="0" i="0" u="none" strike="noStrike" cap="none" dirty="0">
-              <a:solidFill>
-                <a:srgbClr val="000000"/>
-              </a:solidFill>
-              <a:latin typeface="Poppins"/>
-              <a:ea typeface="Poppins"/>
-              <a:cs typeface="Poppins"/>
-              <a:sym typeface="Poppins"/>
-            </a:endParaRPr>
+            <a:endParaRPr dirty="0"/>
           </a:p>
           <a:p>
             <a:pPr marL="0" marR="0" lvl="0" indent="0" algn="ctr" rtl="0">
@@ -13814,9 +15184,20 @@
                 <a:cs typeface="Poppins"/>
                 <a:sym typeface="Poppins"/>
               </a:rPr>
-              <a:t>Generar reportes.</a:t>
+              <a:t>Agregar documentos de deudores</a:t>
             </a:r>
-            <a:endParaRPr dirty="0"/>
+            <a:r>
+              <a:rPr lang="en" sz="900" b="0" i="0" u="none" strike="noStrike" cap="none" dirty="0" smtClean="0">
+                <a:solidFill>
+                  <a:schemeClr val="dk2"/>
+                </a:solidFill>
+                <a:latin typeface="Poppins"/>
+                <a:ea typeface="Poppins"/>
+                <a:cs typeface="Poppins"/>
+                <a:sym typeface="Poppins"/>
+              </a:rPr>
+              <a:t>.</a:t>
+            </a:r>
           </a:p>
           <a:p>
             <a:pPr marL="0" marR="0" lvl="0" indent="0" algn="ctr" rtl="0">
@@ -13837,16 +15218,15 @@
               <a:buNone/>
             </a:pPr>
             <a:r>
-              <a:rPr lang="en" sz="900" b="0" i="0" u="none" strike="noStrike" cap="none" dirty="0">
+              <a:rPr lang="en" sz="900" dirty="0" smtClean="0">
                 <a:solidFill>
                   <a:schemeClr val="dk2"/>
                 </a:solidFill>
                 <a:latin typeface="Poppins"/>
-                <a:ea typeface="Poppins"/>
                 <a:cs typeface="Poppins"/>
                 <a:sym typeface="Poppins"/>
               </a:rPr>
-              <a:t>Agregar documentos de deudores.</a:t>
+              <a:t>Generar solicitud</a:t>
             </a:r>
             <a:endParaRPr dirty="0"/>
           </a:p>
@@ -13922,7 +15302,7 @@
               <a:buNone/>
             </a:pPr>
             <a:r>
-              <a:rPr lang="en" sz="1200" b="1" i="0" u="none" strike="noStrike" cap="none">
+              <a:rPr lang="en" sz="1200" b="1" i="0" u="none" strike="noStrike" cap="none" dirty="0">
                 <a:solidFill>
                   <a:schemeClr val="dk1"/>
                 </a:solidFill>
@@ -13933,7 +15313,7 @@
               </a:rPr>
               <a:t>DEUDOR</a:t>
             </a:r>
-            <a:endParaRPr/>
+            <a:endParaRPr dirty="0"/>
           </a:p>
           <a:p>
             <a:pPr marL="0" marR="0" lvl="0" indent="0" algn="ctr" rtl="0">
@@ -13953,7 +15333,7 @@
               <a:buFont typeface="Arial"/>
               <a:buNone/>
             </a:pPr>
-            <a:endParaRPr sz="1400" b="0" i="0" u="none" strike="noStrike" cap="none">
+            <a:endParaRPr sz="1400" b="0" i="0" u="none" strike="noStrike" cap="none" dirty="0">
               <a:solidFill>
                 <a:srgbClr val="000000"/>
               </a:solidFill>
@@ -13982,7 +15362,7 @@
               <a:buNone/>
             </a:pPr>
             <a:r>
-              <a:rPr lang="en" sz="900" b="0" i="0" u="none" strike="noStrike" cap="none">
+              <a:rPr lang="en" sz="900" b="0" i="0" u="none" strike="noStrike" cap="none" dirty="0">
                 <a:solidFill>
                   <a:schemeClr val="dk2"/>
                 </a:solidFill>
@@ -13991,9 +15371,51 @@
                 <a:cs typeface="Poppins"/>
                 <a:sym typeface="Poppins"/>
               </a:rPr>
-              <a:t>Consultar datos</a:t>
+              <a:t>Consultar </a:t>
             </a:r>
-            <a:endParaRPr/>
+            <a:r>
+              <a:rPr lang="en" sz="900" b="0" i="0" u="none" strike="noStrike" cap="none" dirty="0" smtClean="0">
+                <a:solidFill>
+                  <a:schemeClr val="dk2"/>
+                </a:solidFill>
+                <a:latin typeface="Poppins"/>
+                <a:ea typeface="Poppins"/>
+                <a:cs typeface="Poppins"/>
+                <a:sym typeface="Poppins"/>
+              </a:rPr>
+              <a:t>datos.</a:t>
+            </a:r>
+          </a:p>
+          <a:p>
+            <a:pPr marL="0" marR="0" lvl="0" indent="0" algn="ctr" rtl="0">
+              <a:lnSpc>
+                <a:spcPct val="100000"/>
+              </a:lnSpc>
+              <a:spcBef>
+                <a:spcPts val="0"/>
+              </a:spcBef>
+              <a:spcAft>
+                <a:spcPts val="0"/>
+              </a:spcAft>
+              <a:buClr>
+                <a:srgbClr val="000000"/>
+              </a:buClr>
+              <a:buSzPts val="900"/>
+              <a:buFont typeface="Arial"/>
+              <a:buNone/>
+            </a:pPr>
+            <a:r>
+              <a:rPr lang="en" sz="900" dirty="0" smtClean="0">
+                <a:solidFill>
+                  <a:schemeClr val="dk2"/>
+                </a:solidFill>
+                <a:latin typeface="Poppins"/>
+                <a:cs typeface="Poppins"/>
+                <a:sym typeface="Poppins"/>
+              </a:rPr>
+              <a:t>Generar Solicitiud</a:t>
+            </a:r>
+            <a:endParaRPr dirty="0"/>
           </a:p>
         </p:txBody>
       </p:sp>

</xml_diff>